<commit_message>
atualizando apresentação ppt fev-2024
</commit_message>
<xml_diff>
--- a/Apresentação - Arquitetura de Computadores.pptx
+++ b/Apresentação - Arquitetura de Computadores.pptx
@@ -6479,11 +6479,19 @@
                   <a:srgbClr val="0070C0"/>
                 </a:solidFill>
               </a:rPr>
-              <a:t>AV1</a:t>
+              <a:t>AV</a:t>
             </a:r>
             <a:r>
               <a:rPr lang="pt-BR" sz="2400" dirty="0"/>
-              <a:t> (Gerada pelo Docente)</a:t>
+              <a:t> (PBL(projeto/problema)/TBL - Gerada pela </a:t>
+            </a:r>
+            <a:r>
+              <a:rPr lang="pt-BR" sz="2400" b="1" dirty="0"/>
+              <a:t>Instituição</a:t>
+            </a:r>
+            <a:r>
+              <a:rPr lang="pt-BR" sz="2400" dirty="0"/>
+              <a:t>)</a:t>
             </a:r>
           </a:p>
           <a:p>
@@ -6493,24 +6501,16 @@
               <a:defRPr/>
             </a:pPr>
             <a:r>
+              <a:rPr lang="pt-BR" sz="2400" b="1" dirty="0"/>
+              <a:t>Peso 4 PBL </a:t>
+            </a:r>
+            <a:r>
               <a:rPr lang="pt-BR" sz="2400" b="1" dirty="0">
                 <a:solidFill>
-                  <a:srgbClr val="FF0000"/>
-                </a:solidFill>
-              </a:rPr>
-              <a:t>AV2</a:t>
-            </a:r>
-            <a:r>
-              <a:rPr lang="pt-BR" sz="2400" dirty="0"/>
-              <a:t> (Gerado pelo BDQ - </a:t>
-            </a:r>
-            <a:r>
-              <a:rPr lang="pt-BR" sz="2400" b="1" dirty="0"/>
-              <a:t>PNI</a:t>
-            </a:r>
-            <a:r>
-              <a:rPr lang="pt-BR" sz="2400" dirty="0"/>
-              <a:t>)</a:t>
+                  <a:srgbClr val="00B0F0"/>
+                </a:solidFill>
+              </a:rPr>
+              <a:t>+ Peso 6 avaliação escrita</a:t>
             </a:r>
           </a:p>
           <a:p>
@@ -6525,7 +6525,7 @@
                   <a:srgbClr val="FF0000"/>
                 </a:solidFill>
               </a:rPr>
-              <a:t>AVD</a:t>
+              <a:t>AVA1</a:t>
             </a:r>
             <a:r>
               <a:rPr lang="pt-BR" sz="2400" dirty="0"/>
@@ -6533,11 +6533,11 @@
             </a:r>
             <a:r>
               <a:rPr lang="pt-BR" sz="2400" b="1" dirty="0"/>
-              <a:t>Crédito Digital</a:t>
+              <a:t>Elaborado pelo docente</a:t>
             </a:r>
             <a:r>
               <a:rPr lang="pt-BR" sz="2400" dirty="0"/>
-              <a:t>)</a:t>
+              <a:t>) até 1 ponto</a:t>
             </a:r>
           </a:p>
           <a:p>
@@ -6552,31 +6552,19 @@
                   <a:srgbClr val="00B050"/>
                 </a:solidFill>
               </a:rPr>
-              <a:t>AV3</a:t>
+              <a:t>AVA2</a:t>
             </a:r>
             <a:r>
               <a:rPr lang="pt-BR" sz="2400" dirty="0"/>
-              <a:t> (Gerado pelo BDQ/Docente - </a:t>
+              <a:t> (Gerada pela </a:t>
             </a:r>
             <a:r>
               <a:rPr lang="pt-BR" sz="2400" b="1" dirty="0"/>
-              <a:t>PNI</a:t>
+              <a:t>Instituição</a:t>
             </a:r>
             <a:r>
               <a:rPr lang="pt-BR" sz="2400" dirty="0"/>
-              <a:t> </a:t>
-            </a:r>
-            <a:r>
-              <a:rPr lang="pt-BR" sz="2400" b="1" dirty="0">
-                <a:solidFill>
-                  <a:srgbClr val="FF0000"/>
-                </a:solidFill>
-              </a:rPr>
-              <a:t>Condicional</a:t>
-            </a:r>
-            <a:r>
-              <a:rPr lang="pt-BR" sz="2400" dirty="0"/>
-              <a:t>)</a:t>
+              <a:t>) até 1 ponto</a:t>
             </a:r>
           </a:p>
           <a:p>
@@ -6618,50 +6606,53 @@
             <a:r>
               <a:rPr lang="pt-BR" sz="2400" b="1" dirty="0">
                 <a:solidFill>
-                  <a:srgbClr val="0070C0"/>
+                  <a:schemeClr val="tx1"/>
                 </a:solidFill>
                 <a:latin typeface="Times New Roman" panose="02020603050405020304" pitchFamily="18" charset="0"/>
                 <a:cs typeface="Times New Roman" panose="02020603050405020304" pitchFamily="18" charset="0"/>
               </a:rPr>
-              <a:t>AV1</a:t>
-            </a:r>
-            <a:r>
-              <a:rPr lang="pt-BR" sz="2400" b="1" dirty="0">
-                <a:solidFill>
-                  <a:srgbClr val="FF0000"/>
+              <a:t>AV</a:t>
+            </a:r>
+            <a:r>
+              <a:rPr lang="pt-BR" sz="2400" dirty="0">
+                <a:solidFill>
+                  <a:schemeClr val="tx1"/>
                 </a:solidFill>
                 <a:latin typeface="Times New Roman" panose="02020603050405020304" pitchFamily="18" charset="0"/>
                 <a:cs typeface="Times New Roman" panose="02020603050405020304" pitchFamily="18" charset="0"/>
               </a:rPr>
-              <a:t> </a:t>
-            </a:r>
-            <a:r>
-              <a:rPr lang="pt-BR" sz="2400" b="1">
-                <a:solidFill>
-                  <a:srgbClr val="FF0000"/>
+              <a:t> + </a:t>
+            </a:r>
+            <a:r>
+              <a:rPr lang="pt-BR" sz="2400" b="1" dirty="0">
+                <a:solidFill>
+                  <a:srgbClr val="0070C0"/>
                 </a:solidFill>
                 <a:latin typeface="Times New Roman" panose="02020603050405020304" pitchFamily="18" charset="0"/>
                 <a:cs typeface="Times New Roman" panose="02020603050405020304" pitchFamily="18" charset="0"/>
               </a:rPr>
-              <a:t>+ AV2</a:t>
-            </a:r>
-            <a:r>
-              <a:rPr lang="pt-BR" sz="2400">
-                <a:solidFill>
-                  <a:schemeClr val="tx1"/>
+              <a:t>AV1</a:t>
+            </a:r>
+            <a:r>
+              <a:rPr lang="pt-BR" sz="2400" b="1" dirty="0">
+                <a:solidFill>
+                  <a:srgbClr val="FF0000"/>
                 </a:solidFill>
                 <a:latin typeface="Times New Roman" panose="02020603050405020304" pitchFamily="18" charset="0"/>
                 <a:cs typeface="Times New Roman" panose="02020603050405020304" pitchFamily="18" charset="0"/>
               </a:rPr>
-              <a:t>) / 2</a:t>
-            </a:r>
-            <a:endParaRPr lang="pt-BR" sz="2400" dirty="0">
-              <a:solidFill>
-                <a:schemeClr val="tx1"/>
-              </a:solidFill>
-              <a:latin typeface="Times New Roman" panose="02020603050405020304" pitchFamily="18" charset="0"/>
-              <a:cs typeface="Times New Roman" panose="02020603050405020304" pitchFamily="18" charset="0"/>
-            </a:endParaRPr>
+              <a:t> + AV2</a:t>
+            </a:r>
+            <a:r>
+              <a:rPr lang="pt-BR" sz="2400" dirty="0">
+                <a:solidFill>
+                  <a:schemeClr val="tx1"/>
+                </a:solidFill>
+                <a:latin typeface="Times New Roman" panose="02020603050405020304" pitchFamily="18" charset="0"/>
+                <a:cs typeface="Times New Roman" panose="02020603050405020304" pitchFamily="18" charset="0"/>
+              </a:rPr>
+              <a:t>)</a:t>
+            </a:r>
           </a:p>
         </p:txBody>
       </p:sp>
@@ -9777,7 +9768,37 @@
                 <a:latin typeface="Times New Roman" panose="02020603050405020304" pitchFamily="18" charset="0"/>
                 <a:cs typeface="Times New Roman" panose="02020603050405020304" pitchFamily="18" charset="0"/>
               </a:rPr>
-              <a:t>Engenheiro Eletricista 7º Semestre - Área1 (Cursando)</a:t>
+              <a:t>Engenheiro Eletricista 9º Semestre </a:t>
+            </a:r>
+            <a:r>
+              <a:rPr lang="pt-BR" altLang="pt-BR" sz="2400" b="1">
+                <a:solidFill>
+                  <a:schemeClr val="accent3">
+                    <a:lumMod val="50000"/>
+                  </a:schemeClr>
+                </a:solidFill>
+                <a:highlight>
+                  <a:srgbClr val="FFFF00"/>
+                </a:highlight>
+                <a:latin typeface="Times New Roman" panose="02020603050405020304" pitchFamily="18" charset="0"/>
+                <a:cs typeface="Times New Roman" panose="02020603050405020304" pitchFamily="18" charset="0"/>
+              </a:rPr>
+              <a:t>- UNIRUY </a:t>
+            </a:r>
+            <a:r>
+              <a:rPr lang="pt-BR" altLang="pt-BR" sz="2400" b="1" dirty="0">
+                <a:solidFill>
+                  <a:schemeClr val="accent3">
+                    <a:lumMod val="50000"/>
+                  </a:schemeClr>
+                </a:solidFill>
+                <a:highlight>
+                  <a:srgbClr val="FFFF00"/>
+                </a:highlight>
+                <a:latin typeface="Times New Roman" panose="02020603050405020304" pitchFamily="18" charset="0"/>
+                <a:cs typeface="Times New Roman" panose="02020603050405020304" pitchFamily="18" charset="0"/>
+              </a:rPr>
+              <a:t>(Cursando)</a:t>
             </a:r>
           </a:p>
           <a:p>

</xml_diff>